<commit_message>
Add content for TDD
</commit_message>
<xml_diff>
--- a/Speaking-Engagements/2024/Google-IO-NA-Connect/Talk-driven development.pptx
+++ b/Speaking-Engagements/2024/Google-IO-NA-Connect/Talk-driven development.pptx
@@ -4,13 +4,22 @@
   <p:sldMasterIdLst>
     <p:sldMasterId id="2147483648" r:id="rId1"/>
   </p:sldMasterIdLst>
+  <p:notesMasterIdLst>
+    <p:notesMasterId r:id="rId14"/>
+  </p:notesMasterIdLst>
   <p:sldIdLst>
     <p:sldId id="256" r:id="rId2"/>
-    <p:sldId id="257" r:id="rId3"/>
-    <p:sldId id="258" r:id="rId4"/>
-    <p:sldId id="259" r:id="rId5"/>
-    <p:sldId id="260" r:id="rId6"/>
-    <p:sldId id="261" r:id="rId7"/>
+    <p:sldId id="263" r:id="rId3"/>
+    <p:sldId id="257" r:id="rId4"/>
+    <p:sldId id="258" r:id="rId5"/>
+    <p:sldId id="267" r:id="rId6"/>
+    <p:sldId id="266" r:id="rId7"/>
+    <p:sldId id="265" r:id="rId8"/>
+    <p:sldId id="259" r:id="rId9"/>
+    <p:sldId id="260" r:id="rId10"/>
+    <p:sldId id="264" r:id="rId11"/>
+    <p:sldId id="261" r:id="rId12"/>
+    <p:sldId id="262" r:id="rId13"/>
   </p:sldIdLst>
   <p:sldSz cx="12192000" cy="6858000"/>
   <p:notesSz cx="6858000" cy="9144000"/>
@@ -109,7 +118,468 @@
       </a:defRPr>
     </a:lvl9pPr>
   </p:defaultTextStyle>
+  <p:extLst>
+    <p:ext uri="{EFAFB233-063F-42B5-8137-9DF3F51BA10A}">
+      <p15:sldGuideLst xmlns:p15="http://schemas.microsoft.com/office/powerpoint/2012/main"/>
+    </p:ext>
+  </p:extLst>
 </p:presentation>
+</file>
+
+<file path=ppt/notesMasters/notesMaster1.xml><?xml version="1.0" encoding="utf-8"?>
+<p:notesMaster xmlns:a="http://schemas.openxmlformats.org/drawingml/2006/main" xmlns:r="http://schemas.openxmlformats.org/officeDocument/2006/relationships" xmlns:p="http://schemas.openxmlformats.org/presentationml/2006/main">
+  <p:cSld>
+    <p:bg>
+      <p:bgRef idx="1001">
+        <a:schemeClr val="bg1"/>
+      </p:bgRef>
+    </p:bg>
+    <p:spTree>
+      <p:nvGrpSpPr>
+        <p:cNvPr id="1" name=""/>
+        <p:cNvGrpSpPr/>
+        <p:nvPr/>
+      </p:nvGrpSpPr>
+      <p:grpSpPr>
+        <a:xfrm>
+          <a:off x="0" y="0"/>
+          <a:ext cx="0" cy="0"/>
+          <a:chOff x="0" y="0"/>
+          <a:chExt cx="0" cy="0"/>
+        </a:xfrm>
+      </p:grpSpPr>
+      <p:sp>
+        <p:nvSpPr>
+          <p:cNvPr id="2" name="Header Placeholder 1"/>
+          <p:cNvSpPr>
+            <a:spLocks noGrp="1"/>
+          </p:cNvSpPr>
+          <p:nvPr>
+            <p:ph type="hdr" sz="quarter"/>
+          </p:nvPr>
+        </p:nvSpPr>
+        <p:spPr>
+          <a:xfrm>
+            <a:off x="0" y="0"/>
+            <a:ext cx="2971800" cy="458788"/>
+          </a:xfrm>
+          <a:prstGeom prst="rect">
+            <a:avLst/>
+          </a:prstGeom>
+        </p:spPr>
+        <p:txBody>
+          <a:bodyPr vert="horz" lIns="91440" tIns="45720" rIns="91440" bIns="45720" rtlCol="0"/>
+          <a:lstStyle>
+            <a:lvl1pPr algn="l">
+              <a:defRPr sz="1200"/>
+            </a:lvl1pPr>
+          </a:lstStyle>
+          <a:p>
+            <a:endParaRPr lang="en-CA"/>
+          </a:p>
+        </p:txBody>
+      </p:sp>
+      <p:sp>
+        <p:nvSpPr>
+          <p:cNvPr id="3" name="Date Placeholder 2"/>
+          <p:cNvSpPr>
+            <a:spLocks noGrp="1"/>
+          </p:cNvSpPr>
+          <p:nvPr>
+            <p:ph type="dt" idx="1"/>
+          </p:nvPr>
+        </p:nvSpPr>
+        <p:spPr>
+          <a:xfrm>
+            <a:off x="3884613" y="0"/>
+            <a:ext cx="2971800" cy="458788"/>
+          </a:xfrm>
+          <a:prstGeom prst="rect">
+            <a:avLst/>
+          </a:prstGeom>
+        </p:spPr>
+        <p:txBody>
+          <a:bodyPr vert="horz" lIns="91440" tIns="45720" rIns="91440" bIns="45720" rtlCol="0"/>
+          <a:lstStyle>
+            <a:lvl1pPr algn="r">
+              <a:defRPr sz="1200"/>
+            </a:lvl1pPr>
+          </a:lstStyle>
+          <a:p>
+            <a:fld id="{F66BD3DA-B2D1-408D-87CF-09625A6DC097}" type="datetimeFigureOut">
+              <a:rPr lang="en-CA" smtClean="0"/>
+              <a:t>2024-05-04</a:t>
+            </a:fld>
+            <a:endParaRPr lang="en-CA"/>
+          </a:p>
+        </p:txBody>
+      </p:sp>
+      <p:sp>
+        <p:nvSpPr>
+          <p:cNvPr id="4" name="Slide Image Placeholder 3"/>
+          <p:cNvSpPr>
+            <a:spLocks noGrp="1" noRot="1" noChangeAspect="1"/>
+          </p:cNvSpPr>
+          <p:nvPr>
+            <p:ph type="sldImg" idx="2"/>
+          </p:nvPr>
+        </p:nvSpPr>
+        <p:spPr>
+          <a:xfrm>
+            <a:off x="685800" y="1143000"/>
+            <a:ext cx="5486400" cy="3086100"/>
+          </a:xfrm>
+          <a:prstGeom prst="rect">
+            <a:avLst/>
+          </a:prstGeom>
+          <a:noFill/>
+          <a:ln w="12700">
+            <a:solidFill>
+              <a:prstClr val="black"/>
+            </a:solidFill>
+          </a:ln>
+        </p:spPr>
+        <p:txBody>
+          <a:bodyPr vert="horz" lIns="91440" tIns="45720" rIns="91440" bIns="45720" rtlCol="0" anchor="ctr"/>
+          <a:lstStyle/>
+          <a:p>
+            <a:endParaRPr lang="en-CA"/>
+          </a:p>
+        </p:txBody>
+      </p:sp>
+      <p:sp>
+        <p:nvSpPr>
+          <p:cNvPr id="5" name="Notes Placeholder 4"/>
+          <p:cNvSpPr>
+            <a:spLocks noGrp="1"/>
+          </p:cNvSpPr>
+          <p:nvPr>
+            <p:ph type="body" sz="quarter" idx="3"/>
+          </p:nvPr>
+        </p:nvSpPr>
+        <p:spPr>
+          <a:xfrm>
+            <a:off x="685800" y="4400550"/>
+            <a:ext cx="5486400" cy="3600450"/>
+          </a:xfrm>
+          <a:prstGeom prst="rect">
+            <a:avLst/>
+          </a:prstGeom>
+        </p:spPr>
+        <p:txBody>
+          <a:bodyPr vert="horz" lIns="91440" tIns="45720" rIns="91440" bIns="45720" rtlCol="0"/>
+          <a:lstStyle/>
+          <a:p>
+            <a:pPr lvl="0"/>
+            <a:r>
+              <a:rPr lang="en-US"/>
+              <a:t>Click to edit Master text styles</a:t>
+            </a:r>
+          </a:p>
+          <a:p>
+            <a:pPr lvl="1"/>
+            <a:r>
+              <a:rPr lang="en-US"/>
+              <a:t>Second level</a:t>
+            </a:r>
+          </a:p>
+          <a:p>
+            <a:pPr lvl="2"/>
+            <a:r>
+              <a:rPr lang="en-US"/>
+              <a:t>Third level</a:t>
+            </a:r>
+          </a:p>
+          <a:p>
+            <a:pPr lvl="3"/>
+            <a:r>
+              <a:rPr lang="en-US"/>
+              <a:t>Fourth level</a:t>
+            </a:r>
+          </a:p>
+          <a:p>
+            <a:pPr lvl="4"/>
+            <a:r>
+              <a:rPr lang="en-US"/>
+              <a:t>Fifth level</a:t>
+            </a:r>
+            <a:endParaRPr lang="en-CA"/>
+          </a:p>
+        </p:txBody>
+      </p:sp>
+      <p:sp>
+        <p:nvSpPr>
+          <p:cNvPr id="6" name="Footer Placeholder 5"/>
+          <p:cNvSpPr>
+            <a:spLocks noGrp="1"/>
+          </p:cNvSpPr>
+          <p:nvPr>
+            <p:ph type="ftr" sz="quarter" idx="4"/>
+          </p:nvPr>
+        </p:nvSpPr>
+        <p:spPr>
+          <a:xfrm>
+            <a:off x="0" y="8685213"/>
+            <a:ext cx="2971800" cy="458787"/>
+          </a:xfrm>
+          <a:prstGeom prst="rect">
+            <a:avLst/>
+          </a:prstGeom>
+        </p:spPr>
+        <p:txBody>
+          <a:bodyPr vert="horz" lIns="91440" tIns="45720" rIns="91440" bIns="45720" rtlCol="0" anchor="b"/>
+          <a:lstStyle>
+            <a:lvl1pPr algn="l">
+              <a:defRPr sz="1200"/>
+            </a:lvl1pPr>
+          </a:lstStyle>
+          <a:p>
+            <a:endParaRPr lang="en-CA"/>
+          </a:p>
+        </p:txBody>
+      </p:sp>
+      <p:sp>
+        <p:nvSpPr>
+          <p:cNvPr id="7" name="Slide Number Placeholder 6"/>
+          <p:cNvSpPr>
+            <a:spLocks noGrp="1"/>
+          </p:cNvSpPr>
+          <p:nvPr>
+            <p:ph type="sldNum" sz="quarter" idx="5"/>
+          </p:nvPr>
+        </p:nvSpPr>
+        <p:spPr>
+          <a:xfrm>
+            <a:off x="3884613" y="8685213"/>
+            <a:ext cx="2971800" cy="458787"/>
+          </a:xfrm>
+          <a:prstGeom prst="rect">
+            <a:avLst/>
+          </a:prstGeom>
+        </p:spPr>
+        <p:txBody>
+          <a:bodyPr vert="horz" lIns="91440" tIns="45720" rIns="91440" bIns="45720" rtlCol="0" anchor="b"/>
+          <a:lstStyle>
+            <a:lvl1pPr algn="r">
+              <a:defRPr sz="1200"/>
+            </a:lvl1pPr>
+          </a:lstStyle>
+          <a:p>
+            <a:fld id="{DC0329A6-C8D7-4C64-9576-8A0846EC776A}" type="slidenum">
+              <a:rPr lang="en-CA" smtClean="0"/>
+              <a:t>‹#›</a:t>
+            </a:fld>
+            <a:endParaRPr lang="en-CA"/>
+          </a:p>
+        </p:txBody>
+      </p:sp>
+    </p:spTree>
+    <p:extLst>
+      <p:ext uri="{BB962C8B-B14F-4D97-AF65-F5344CB8AC3E}">
+        <p14:creationId xmlns:p14="http://schemas.microsoft.com/office/powerpoint/2010/main" val="857622479"/>
+      </p:ext>
+    </p:extLst>
+  </p:cSld>
+  <p:clrMap bg1="lt1" tx1="dk1" bg2="lt2" tx2="dk2" accent1="accent1" accent2="accent2" accent3="accent3" accent4="accent4" accent5="accent5" accent6="accent6" hlink="hlink" folHlink="folHlink"/>
+  <p:notesStyle>
+    <a:lvl1pPr marL="0" algn="l" defTabSz="914400" rtl="0" eaLnBrk="1" latinLnBrk="0" hangingPunct="1">
+      <a:defRPr sz="1200" kern="1200">
+        <a:solidFill>
+          <a:schemeClr val="tx1"/>
+        </a:solidFill>
+        <a:latin typeface="+mn-lt"/>
+        <a:ea typeface="+mn-ea"/>
+        <a:cs typeface="+mn-cs"/>
+      </a:defRPr>
+    </a:lvl1pPr>
+    <a:lvl2pPr marL="457200" algn="l" defTabSz="914400" rtl="0" eaLnBrk="1" latinLnBrk="0" hangingPunct="1">
+      <a:defRPr sz="1200" kern="1200">
+        <a:solidFill>
+          <a:schemeClr val="tx1"/>
+        </a:solidFill>
+        <a:latin typeface="+mn-lt"/>
+        <a:ea typeface="+mn-ea"/>
+        <a:cs typeface="+mn-cs"/>
+      </a:defRPr>
+    </a:lvl2pPr>
+    <a:lvl3pPr marL="914400" algn="l" defTabSz="914400" rtl="0" eaLnBrk="1" latinLnBrk="0" hangingPunct="1">
+      <a:defRPr sz="1200" kern="1200">
+        <a:solidFill>
+          <a:schemeClr val="tx1"/>
+        </a:solidFill>
+        <a:latin typeface="+mn-lt"/>
+        <a:ea typeface="+mn-ea"/>
+        <a:cs typeface="+mn-cs"/>
+      </a:defRPr>
+    </a:lvl3pPr>
+    <a:lvl4pPr marL="1371600" algn="l" defTabSz="914400" rtl="0" eaLnBrk="1" latinLnBrk="0" hangingPunct="1">
+      <a:defRPr sz="1200" kern="1200">
+        <a:solidFill>
+          <a:schemeClr val="tx1"/>
+        </a:solidFill>
+        <a:latin typeface="+mn-lt"/>
+        <a:ea typeface="+mn-ea"/>
+        <a:cs typeface="+mn-cs"/>
+      </a:defRPr>
+    </a:lvl4pPr>
+    <a:lvl5pPr marL="1828800" algn="l" defTabSz="914400" rtl="0" eaLnBrk="1" latinLnBrk="0" hangingPunct="1">
+      <a:defRPr sz="1200" kern="1200">
+        <a:solidFill>
+          <a:schemeClr val="tx1"/>
+        </a:solidFill>
+        <a:latin typeface="+mn-lt"/>
+        <a:ea typeface="+mn-ea"/>
+        <a:cs typeface="+mn-cs"/>
+      </a:defRPr>
+    </a:lvl5pPr>
+    <a:lvl6pPr marL="2286000" algn="l" defTabSz="914400" rtl="0" eaLnBrk="1" latinLnBrk="0" hangingPunct="1">
+      <a:defRPr sz="1200" kern="1200">
+        <a:solidFill>
+          <a:schemeClr val="tx1"/>
+        </a:solidFill>
+        <a:latin typeface="+mn-lt"/>
+        <a:ea typeface="+mn-ea"/>
+        <a:cs typeface="+mn-cs"/>
+      </a:defRPr>
+    </a:lvl6pPr>
+    <a:lvl7pPr marL="2743200" algn="l" defTabSz="914400" rtl="0" eaLnBrk="1" latinLnBrk="0" hangingPunct="1">
+      <a:defRPr sz="1200" kern="1200">
+        <a:solidFill>
+          <a:schemeClr val="tx1"/>
+        </a:solidFill>
+        <a:latin typeface="+mn-lt"/>
+        <a:ea typeface="+mn-ea"/>
+        <a:cs typeface="+mn-cs"/>
+      </a:defRPr>
+    </a:lvl7pPr>
+    <a:lvl8pPr marL="3200400" algn="l" defTabSz="914400" rtl="0" eaLnBrk="1" latinLnBrk="0" hangingPunct="1">
+      <a:defRPr sz="1200" kern="1200">
+        <a:solidFill>
+          <a:schemeClr val="tx1"/>
+        </a:solidFill>
+        <a:latin typeface="+mn-lt"/>
+        <a:ea typeface="+mn-ea"/>
+        <a:cs typeface="+mn-cs"/>
+      </a:defRPr>
+    </a:lvl8pPr>
+    <a:lvl9pPr marL="3657600" algn="l" defTabSz="914400" rtl="0" eaLnBrk="1" latinLnBrk="0" hangingPunct="1">
+      <a:defRPr sz="1200" kern="1200">
+        <a:solidFill>
+          <a:schemeClr val="tx1"/>
+        </a:solidFill>
+        <a:latin typeface="+mn-lt"/>
+        <a:ea typeface="+mn-ea"/>
+        <a:cs typeface="+mn-cs"/>
+      </a:defRPr>
+    </a:lvl9pPr>
+  </p:notesStyle>
+</p:notesMaster>
+</file>
+
+<file path=ppt/notesSlides/notesSlide1.xml><?xml version="1.0" encoding="utf-8"?>
+<p:notes xmlns:a="http://schemas.openxmlformats.org/drawingml/2006/main" xmlns:r="http://schemas.openxmlformats.org/officeDocument/2006/relationships" xmlns:p="http://schemas.openxmlformats.org/presentationml/2006/main">
+  <p:cSld>
+    <p:spTree>
+      <p:nvGrpSpPr>
+        <p:cNvPr id="1" name=""/>
+        <p:cNvGrpSpPr/>
+        <p:nvPr/>
+      </p:nvGrpSpPr>
+      <p:grpSpPr>
+        <a:xfrm>
+          <a:off x="0" y="0"/>
+          <a:ext cx="0" cy="0"/>
+          <a:chOff x="0" y="0"/>
+          <a:chExt cx="0" cy="0"/>
+        </a:xfrm>
+      </p:grpSpPr>
+      <p:sp>
+        <p:nvSpPr>
+          <p:cNvPr id="2" name="Slide Image Placeholder 1"/>
+          <p:cNvSpPr>
+            <a:spLocks noGrp="1" noRot="1" noChangeAspect="1"/>
+          </p:cNvSpPr>
+          <p:nvPr>
+            <p:ph type="sldImg"/>
+          </p:nvPr>
+        </p:nvSpPr>
+        <p:spPr/>
+      </p:sp>
+      <p:sp>
+        <p:nvSpPr>
+          <p:cNvPr id="3" name="Notes Placeholder 2"/>
+          <p:cNvSpPr>
+            <a:spLocks noGrp="1"/>
+          </p:cNvSpPr>
+          <p:nvPr>
+            <p:ph type="body" idx="1"/>
+          </p:nvPr>
+        </p:nvSpPr>
+        <p:spPr/>
+        <p:txBody>
+          <a:bodyPr/>
+          <a:lstStyle/>
+          <a:p>
+            <a:r>
+              <a:rPr lang="en-US" dirty="0"/>
+              <a:t>Jason Roberts : https://twitter.com/exojason?lang=en</a:t>
+            </a:r>
+          </a:p>
+          <a:p>
+            <a:r>
+              <a:rPr lang="en-US" dirty="0"/>
+              <a:t>Coder, entrepreneur, and podcaster </a:t>
+            </a:r>
+          </a:p>
+          <a:p>
+            <a:r>
+              <a:rPr lang="en-US" dirty="0"/>
+              <a:t>@techzing</a:t>
+            </a:r>
+          </a:p>
+          <a:p>
+            <a:r>
+              <a:rPr lang="en-US" dirty="0"/>
+              <a:t>. Wrote a lot </a:t>
+            </a:r>
+            <a:endParaRPr lang="en-CA" dirty="0"/>
+          </a:p>
+        </p:txBody>
+      </p:sp>
+      <p:sp>
+        <p:nvSpPr>
+          <p:cNvPr id="4" name="Slide Number Placeholder 3"/>
+          <p:cNvSpPr>
+            <a:spLocks noGrp="1"/>
+          </p:cNvSpPr>
+          <p:nvPr>
+            <p:ph type="sldNum" sz="quarter" idx="5"/>
+          </p:nvPr>
+        </p:nvSpPr>
+        <p:spPr/>
+        <p:txBody>
+          <a:bodyPr/>
+          <a:lstStyle/>
+          <a:p>
+            <a:fld id="{DC0329A6-C8D7-4C64-9576-8A0846EC776A}" type="slidenum">
+              <a:rPr lang="en-CA" smtClean="0"/>
+              <a:t>4</a:t>
+            </a:fld>
+            <a:endParaRPr lang="en-CA"/>
+          </a:p>
+        </p:txBody>
+      </p:sp>
+    </p:spTree>
+    <p:extLst>
+      <p:ext uri="{BB962C8B-B14F-4D97-AF65-F5344CB8AC3E}">
+        <p14:creationId xmlns:p14="http://schemas.microsoft.com/office/powerpoint/2010/main" val="3128458897"/>
+      </p:ext>
+    </p:extLst>
+  </p:cSld>
+  <p:clrMapOvr>
+    <a:masterClrMapping/>
+  </p:clrMapOvr>
+</p:notes>
 </file>
 
 <file path=ppt/slideLayouts/slideLayout1.xml><?xml version="1.0" encoding="utf-8"?>
@@ -261,7 +731,7 @@
           <a:p>
             <a:fld id="{413B6E00-3E16-4C50-89A7-B2B4440B9D0C}" type="datetimeFigureOut">
               <a:rPr lang="en-CA" smtClean="0"/>
-              <a:t>2024-05-01</a:t>
+              <a:t>2024-05-04</a:t>
             </a:fld>
             <a:endParaRPr lang="en-CA"/>
           </a:p>
@@ -461,7 +931,7 @@
           <a:p>
             <a:fld id="{413B6E00-3E16-4C50-89A7-B2B4440B9D0C}" type="datetimeFigureOut">
               <a:rPr lang="en-CA" smtClean="0"/>
-              <a:t>2024-05-01</a:t>
+              <a:t>2024-05-04</a:t>
             </a:fld>
             <a:endParaRPr lang="en-CA"/>
           </a:p>
@@ -671,7 +1141,7 @@
           <a:p>
             <a:fld id="{413B6E00-3E16-4C50-89A7-B2B4440B9D0C}" type="datetimeFigureOut">
               <a:rPr lang="en-CA" smtClean="0"/>
-              <a:t>2024-05-01</a:t>
+              <a:t>2024-05-04</a:t>
             </a:fld>
             <a:endParaRPr lang="en-CA"/>
           </a:p>
@@ -871,7 +1341,7 @@
           <a:p>
             <a:fld id="{413B6E00-3E16-4C50-89A7-B2B4440B9D0C}" type="datetimeFigureOut">
               <a:rPr lang="en-CA" smtClean="0"/>
-              <a:t>2024-05-01</a:t>
+              <a:t>2024-05-04</a:t>
             </a:fld>
             <a:endParaRPr lang="en-CA"/>
           </a:p>
@@ -1147,7 +1617,7 @@
           <a:p>
             <a:fld id="{413B6E00-3E16-4C50-89A7-B2B4440B9D0C}" type="datetimeFigureOut">
               <a:rPr lang="en-CA" smtClean="0"/>
-              <a:t>2024-05-01</a:t>
+              <a:t>2024-05-04</a:t>
             </a:fld>
             <a:endParaRPr lang="en-CA"/>
           </a:p>
@@ -1415,7 +1885,7 @@
           <a:p>
             <a:fld id="{413B6E00-3E16-4C50-89A7-B2B4440B9D0C}" type="datetimeFigureOut">
               <a:rPr lang="en-CA" smtClean="0"/>
-              <a:t>2024-05-01</a:t>
+              <a:t>2024-05-04</a:t>
             </a:fld>
             <a:endParaRPr lang="en-CA"/>
           </a:p>
@@ -1830,7 +2300,7 @@
           <a:p>
             <a:fld id="{413B6E00-3E16-4C50-89A7-B2B4440B9D0C}" type="datetimeFigureOut">
               <a:rPr lang="en-CA" smtClean="0"/>
-              <a:t>2024-05-01</a:t>
+              <a:t>2024-05-04</a:t>
             </a:fld>
             <a:endParaRPr lang="en-CA"/>
           </a:p>
@@ -1972,7 +2442,7 @@
           <a:p>
             <a:fld id="{413B6E00-3E16-4C50-89A7-B2B4440B9D0C}" type="datetimeFigureOut">
               <a:rPr lang="en-CA" smtClean="0"/>
-              <a:t>2024-05-01</a:t>
+              <a:t>2024-05-04</a:t>
             </a:fld>
             <a:endParaRPr lang="en-CA"/>
           </a:p>
@@ -2085,7 +2555,7 @@
           <a:p>
             <a:fld id="{413B6E00-3E16-4C50-89A7-B2B4440B9D0C}" type="datetimeFigureOut">
               <a:rPr lang="en-CA" smtClean="0"/>
-              <a:t>2024-05-01</a:t>
+              <a:t>2024-05-04</a:t>
             </a:fld>
             <a:endParaRPr lang="en-CA"/>
           </a:p>
@@ -2398,7 +2868,7 @@
           <a:p>
             <a:fld id="{413B6E00-3E16-4C50-89A7-B2B4440B9D0C}" type="datetimeFigureOut">
               <a:rPr lang="en-CA" smtClean="0"/>
-              <a:t>2024-05-01</a:t>
+              <a:t>2024-05-04</a:t>
             </a:fld>
             <a:endParaRPr lang="en-CA"/>
           </a:p>
@@ -2687,7 +3157,7 @@
           <a:p>
             <a:fld id="{413B6E00-3E16-4C50-89A7-B2B4440B9D0C}" type="datetimeFigureOut">
               <a:rPr lang="en-CA" smtClean="0"/>
-              <a:t>2024-05-01</a:t>
+              <a:t>2024-05-04</a:t>
             </a:fld>
             <a:endParaRPr lang="en-CA"/>
           </a:p>
@@ -2930,7 +3400,7 @@
           <a:p>
             <a:fld id="{413B6E00-3E16-4C50-89A7-B2B4440B9D0C}" type="datetimeFigureOut">
               <a:rPr lang="en-CA" smtClean="0"/>
-              <a:t>2024-05-01</a:t>
+              <a:t>2024-05-04</a:t>
             </a:fld>
             <a:endParaRPr lang="en-CA"/>
           </a:p>
@@ -3452,7 +3922,10 @@
           <a:bodyPr/>
           <a:lstStyle/>
           <a:p>
-            <a:endParaRPr lang="en-CA"/>
+            <a:r>
+              <a:rPr lang="en-CA" dirty="0"/>
+              <a:t>Vaishnavi</a:t>
+            </a:r>
           </a:p>
         </p:txBody>
       </p:sp>
@@ -3460,6 +3933,300 @@
     <p:extLst>
       <p:ext uri="{BB962C8B-B14F-4D97-AF65-F5344CB8AC3E}">
         <p14:creationId xmlns:p14="http://schemas.microsoft.com/office/powerpoint/2010/main" val="103335352"/>
+      </p:ext>
+    </p:extLst>
+  </p:cSld>
+  <p:clrMapOvr>
+    <a:masterClrMapping/>
+  </p:clrMapOvr>
+</p:sld>
+</file>
+
+<file path=ppt/slides/slide10.xml><?xml version="1.0" encoding="utf-8"?>
+<p:sld xmlns:a="http://schemas.openxmlformats.org/drawingml/2006/main" xmlns:r="http://schemas.openxmlformats.org/officeDocument/2006/relationships" xmlns:p="http://schemas.openxmlformats.org/presentationml/2006/main">
+  <p:cSld>
+    <p:spTree>
+      <p:nvGrpSpPr>
+        <p:cNvPr id="1" name=""/>
+        <p:cNvGrpSpPr/>
+        <p:nvPr/>
+      </p:nvGrpSpPr>
+      <p:grpSpPr>
+        <a:xfrm>
+          <a:off x="0" y="0"/>
+          <a:ext cx="0" cy="0"/>
+          <a:chOff x="0" y="0"/>
+          <a:chExt cx="0" cy="0"/>
+        </a:xfrm>
+      </p:grpSpPr>
+      <p:sp>
+        <p:nvSpPr>
+          <p:cNvPr id="2" name="Title 1">
+            <a:extLst>
+              <a:ext uri="{FF2B5EF4-FFF2-40B4-BE49-F238E27FC236}">
+                <a16:creationId xmlns:a16="http://schemas.microsoft.com/office/drawing/2014/main" id="{91970E6D-0B94-D214-1C22-A4D477F5EA83}"/>
+              </a:ext>
+            </a:extLst>
+          </p:cNvPr>
+          <p:cNvSpPr>
+            <a:spLocks noGrp="1"/>
+          </p:cNvSpPr>
+          <p:nvPr>
+            <p:ph type="title"/>
+          </p:nvPr>
+        </p:nvSpPr>
+        <p:spPr/>
+        <p:txBody>
+          <a:bodyPr/>
+          <a:lstStyle/>
+          <a:p>
+            <a:r>
+              <a:rPr lang="en-US" dirty="0"/>
+              <a:t>The protégé effect</a:t>
+            </a:r>
+            <a:endParaRPr lang="en-CA" dirty="0"/>
+          </a:p>
+        </p:txBody>
+      </p:sp>
+      <p:sp>
+        <p:nvSpPr>
+          <p:cNvPr id="3" name="Content Placeholder 2">
+            <a:extLst>
+              <a:ext uri="{FF2B5EF4-FFF2-40B4-BE49-F238E27FC236}">
+                <a16:creationId xmlns:a16="http://schemas.microsoft.com/office/drawing/2014/main" id="{C4438539-8587-A60F-88DC-5714B5EED000}"/>
+              </a:ext>
+            </a:extLst>
+          </p:cNvPr>
+          <p:cNvSpPr>
+            <a:spLocks noGrp="1"/>
+          </p:cNvSpPr>
+          <p:nvPr>
+            <p:ph idx="1"/>
+          </p:nvPr>
+        </p:nvSpPr>
+        <p:spPr/>
+        <p:txBody>
+          <a:bodyPr/>
+          <a:lstStyle/>
+          <a:p>
+            <a:endParaRPr lang="en-US" dirty="0"/>
+          </a:p>
+          <a:p>
+            <a:r>
+              <a:rPr lang="en-US" dirty="0"/>
+              <a:t>The protégé effect is a concept in learning that suggests we learn more effectively by teaching information to others, even if those others aren’t necessarily any less knowledgeable. </a:t>
+            </a:r>
+          </a:p>
+          <a:p>
+            <a:endParaRPr lang="en-US" dirty="0"/>
+          </a:p>
+          <a:p>
+            <a:endParaRPr lang="en-US" dirty="0"/>
+          </a:p>
+          <a:p>
+            <a:r>
+              <a:rPr lang="en-US" dirty="0"/>
+              <a:t>As author Robert Heinlein puts it, ‘when one teaches, two learn’.</a:t>
+            </a:r>
+          </a:p>
+          <a:p>
+            <a:endParaRPr lang="en-CA" dirty="0"/>
+          </a:p>
+        </p:txBody>
+      </p:sp>
+    </p:spTree>
+    <p:extLst>
+      <p:ext uri="{BB962C8B-B14F-4D97-AF65-F5344CB8AC3E}">
+        <p14:creationId xmlns:p14="http://schemas.microsoft.com/office/powerpoint/2010/main" val="827686649"/>
+      </p:ext>
+    </p:extLst>
+  </p:cSld>
+  <p:clrMapOvr>
+    <a:masterClrMapping/>
+  </p:clrMapOvr>
+</p:sld>
+</file>
+
+<file path=ppt/slides/slide11.xml><?xml version="1.0" encoding="utf-8"?>
+<p:sld xmlns:a="http://schemas.openxmlformats.org/drawingml/2006/main" xmlns:r="http://schemas.openxmlformats.org/officeDocument/2006/relationships" xmlns:p="http://schemas.openxmlformats.org/presentationml/2006/main">
+  <p:cSld>
+    <p:spTree>
+      <p:nvGrpSpPr>
+        <p:cNvPr id="1" name=""/>
+        <p:cNvGrpSpPr/>
+        <p:nvPr/>
+      </p:nvGrpSpPr>
+      <p:grpSpPr>
+        <a:xfrm>
+          <a:off x="0" y="0"/>
+          <a:ext cx="0" cy="0"/>
+          <a:chOff x="0" y="0"/>
+          <a:chExt cx="0" cy="0"/>
+        </a:xfrm>
+      </p:grpSpPr>
+      <p:sp>
+        <p:nvSpPr>
+          <p:cNvPr id="2" name="Title 1">
+            <a:extLst>
+              <a:ext uri="{FF2B5EF4-FFF2-40B4-BE49-F238E27FC236}">
+                <a16:creationId xmlns:a16="http://schemas.microsoft.com/office/drawing/2014/main" id="{6A73ADAF-122A-F2BA-074F-55CFFF9C846A}"/>
+              </a:ext>
+            </a:extLst>
+          </p:cNvPr>
+          <p:cNvSpPr>
+            <a:spLocks noGrp="1"/>
+          </p:cNvSpPr>
+          <p:nvPr>
+            <p:ph type="title"/>
+          </p:nvPr>
+        </p:nvSpPr>
+        <p:spPr/>
+        <p:txBody>
+          <a:bodyPr/>
+          <a:lstStyle/>
+          <a:p>
+            <a:r>
+              <a:rPr lang="en-CA" b="0" i="0" dirty="0">
+                <a:solidFill>
+                  <a:srgbClr val="1F2328"/>
+                </a:solidFill>
+                <a:effectLst/>
+                <a:highlight>
+                  <a:srgbClr val="FFFFFF"/>
+                </a:highlight>
+                <a:latin typeface="Mona Sans"/>
+              </a:rPr>
+              <a:t>process, care, and craft</a:t>
+            </a:r>
+            <a:endParaRPr lang="en-CA" dirty="0"/>
+          </a:p>
+        </p:txBody>
+      </p:sp>
+      <p:sp>
+        <p:nvSpPr>
+          <p:cNvPr id="3" name="Content Placeholder 2">
+            <a:extLst>
+              <a:ext uri="{FF2B5EF4-FFF2-40B4-BE49-F238E27FC236}">
+                <a16:creationId xmlns:a16="http://schemas.microsoft.com/office/drawing/2014/main" id="{33D86B02-AEF2-2387-ADD5-3763EB8923C7}"/>
+              </a:ext>
+            </a:extLst>
+          </p:cNvPr>
+          <p:cNvSpPr>
+            <a:spLocks noGrp="1"/>
+          </p:cNvSpPr>
+          <p:nvPr>
+            <p:ph idx="1"/>
+          </p:nvPr>
+        </p:nvSpPr>
+        <p:spPr/>
+        <p:txBody>
+          <a:bodyPr/>
+          <a:lstStyle/>
+          <a:p>
+            <a:r>
+              <a:rPr lang="en-US" b="0" i="0">
+                <a:solidFill>
+                  <a:srgbClr val="1F2328"/>
+                </a:solidFill>
+                <a:effectLst/>
+                <a:highlight>
+                  <a:srgbClr val="FFFFFF"/>
+                </a:highlight>
+                <a:latin typeface="Mona Sans"/>
+              </a:rPr>
+              <a:t>Digital gardening embraces the idea that the process of documenting is more important than the final presentation.</a:t>
+            </a:r>
+            <a:endParaRPr lang="en-CA" dirty="0"/>
+          </a:p>
+        </p:txBody>
+      </p:sp>
+    </p:spTree>
+    <p:extLst>
+      <p:ext uri="{BB962C8B-B14F-4D97-AF65-F5344CB8AC3E}">
+        <p14:creationId xmlns:p14="http://schemas.microsoft.com/office/powerpoint/2010/main" val="397074678"/>
+      </p:ext>
+    </p:extLst>
+  </p:cSld>
+  <p:clrMapOvr>
+    <a:masterClrMapping/>
+  </p:clrMapOvr>
+</p:sld>
+</file>
+
+<file path=ppt/slides/slide12.xml><?xml version="1.0" encoding="utf-8"?>
+<p:sld xmlns:a="http://schemas.openxmlformats.org/drawingml/2006/main" xmlns:r="http://schemas.openxmlformats.org/officeDocument/2006/relationships" xmlns:p="http://schemas.openxmlformats.org/presentationml/2006/main">
+  <p:cSld>
+    <p:spTree>
+      <p:nvGrpSpPr>
+        <p:cNvPr id="1" name=""/>
+        <p:cNvGrpSpPr/>
+        <p:nvPr/>
+      </p:nvGrpSpPr>
+      <p:grpSpPr>
+        <a:xfrm>
+          <a:off x="0" y="0"/>
+          <a:ext cx="0" cy="0"/>
+          <a:chOff x="0" y="0"/>
+          <a:chExt cx="0" cy="0"/>
+        </a:xfrm>
+      </p:grpSpPr>
+      <p:sp>
+        <p:nvSpPr>
+          <p:cNvPr id="2" name="Title 1">
+            <a:extLst>
+              <a:ext uri="{FF2B5EF4-FFF2-40B4-BE49-F238E27FC236}">
+                <a16:creationId xmlns:a16="http://schemas.microsoft.com/office/drawing/2014/main" id="{2203CE51-FFC4-9039-AEE8-977EB52A2F6E}"/>
+              </a:ext>
+            </a:extLst>
+          </p:cNvPr>
+          <p:cNvSpPr>
+            <a:spLocks noGrp="1"/>
+          </p:cNvSpPr>
+          <p:nvPr>
+            <p:ph type="title"/>
+          </p:nvPr>
+        </p:nvSpPr>
+        <p:spPr/>
+        <p:txBody>
+          <a:bodyPr/>
+          <a:lstStyle/>
+          <a:p>
+            <a:r>
+              <a:rPr lang="en-CA" dirty="0"/>
+              <a:t>References</a:t>
+            </a:r>
+          </a:p>
+        </p:txBody>
+      </p:sp>
+      <p:sp>
+        <p:nvSpPr>
+          <p:cNvPr id="3" name="Content Placeholder 2">
+            <a:extLst>
+              <a:ext uri="{FF2B5EF4-FFF2-40B4-BE49-F238E27FC236}">
+                <a16:creationId xmlns:a16="http://schemas.microsoft.com/office/drawing/2014/main" id="{47D5EE0A-4A0C-F44B-518F-246AE22C4277}"/>
+              </a:ext>
+            </a:extLst>
+          </p:cNvPr>
+          <p:cNvSpPr>
+            <a:spLocks noGrp="1"/>
+          </p:cNvSpPr>
+          <p:nvPr>
+            <p:ph idx="1"/>
+          </p:nvPr>
+        </p:nvSpPr>
+        <p:spPr/>
+        <p:txBody>
+          <a:bodyPr/>
+          <a:lstStyle/>
+          <a:p>
+            <a:endParaRPr lang="en-CA" dirty="0"/>
+          </a:p>
+        </p:txBody>
+      </p:sp>
+    </p:spTree>
+    <p:extLst>
+      <p:ext uri="{BB962C8B-B14F-4D97-AF65-F5344CB8AC3E}">
+        <p14:creationId xmlns:p14="http://schemas.microsoft.com/office/powerpoint/2010/main" val="2587446173"/>
       </p:ext>
     </p:extLst>
   </p:cSld>
@@ -3537,10 +4304,10 @@
       </p:sp>
       <p:sp>
         <p:nvSpPr>
-          <p:cNvPr id="3" name="Content Placeholder 2">
-            <a:extLst>
-              <a:ext uri="{FF2B5EF4-FFF2-40B4-BE49-F238E27FC236}">
-                <a16:creationId xmlns:a16="http://schemas.microsoft.com/office/drawing/2014/main" id="{9C61938C-7C02-5331-5286-B1C62D430057}"/>
+          <p:cNvPr id="5" name="Content Placeholder 4">
+            <a:extLst>
+              <a:ext uri="{FF2B5EF4-FFF2-40B4-BE49-F238E27FC236}">
+                <a16:creationId xmlns:a16="http://schemas.microsoft.com/office/drawing/2014/main" id="{1141A8B0-A68F-0B01-1E41-C3944090CF9A}"/>
               </a:ext>
             </a:extLst>
           </p:cNvPr>
@@ -3556,45 +4323,6 @@
           <a:bodyPr/>
           <a:lstStyle/>
           <a:p>
-            <a:r>
-              <a:rPr lang="en-US" b="0" i="0" dirty="0">
-                <a:solidFill>
-                  <a:srgbClr val="1F2328"/>
-                </a:solidFill>
-                <a:effectLst/>
-                <a:highlight>
-                  <a:srgbClr val="FFFFFF"/>
-                </a:highlight>
-                <a:latin typeface="Mona Sans"/>
-              </a:rPr>
-              <a:t>Luck is when something unexpected and good happens to you. Unexpected and good. Who doesn’t want to increase the odds of something unexpected and good?</a:t>
-            </a:r>
-          </a:p>
-          <a:p>
-            <a:endParaRPr lang="en-US" dirty="0">
-              <a:solidFill>
-                <a:srgbClr val="1F2328"/>
-              </a:solidFill>
-              <a:highlight>
-                <a:srgbClr val="FFFFFF"/>
-              </a:highlight>
-              <a:latin typeface="Mona Sans"/>
-            </a:endParaRPr>
-          </a:p>
-          <a:p>
-            <a:r>
-              <a:rPr lang="en-US" b="0" i="0" dirty="0">
-                <a:solidFill>
-                  <a:srgbClr val="1F2328"/>
-                </a:solidFill>
-                <a:effectLst/>
-                <a:highlight>
-                  <a:srgbClr val="FFFFFF"/>
-                </a:highlight>
-                <a:latin typeface="Mona Sans"/>
-              </a:rPr>
-              <a:t>How can we increase the odds of finding luck? By being a person who works in public. By doing work and being public about it, you build a reputation for yourself. You build a track record. You build a public body of work that speaks on your behalf better than any resume ever could.</a:t>
-            </a:r>
             <a:endParaRPr lang="en-CA" dirty="0"/>
           </a:p>
         </p:txBody>
@@ -3602,7 +4330,7 @@
     </p:spTree>
     <p:extLst>
       <p:ext uri="{BB962C8B-B14F-4D97-AF65-F5344CB8AC3E}">
-        <p14:creationId xmlns:p14="http://schemas.microsoft.com/office/powerpoint/2010/main" val="2397863608"/>
+        <p14:creationId xmlns:p14="http://schemas.microsoft.com/office/powerpoint/2010/main" val="1992498379"/>
       </p:ext>
     </p:extLst>
   </p:cSld>
@@ -3634,7 +4362,7 @@
           <p:cNvPr id="2" name="Title 1">
             <a:extLst>
               <a:ext uri="{FF2B5EF4-FFF2-40B4-BE49-F238E27FC236}">
-                <a16:creationId xmlns:a16="http://schemas.microsoft.com/office/drawing/2014/main" id="{9643BAE4-7376-23A4-B38D-AA5768AC943C}"/>
+                <a16:creationId xmlns:a16="http://schemas.microsoft.com/office/drawing/2014/main" id="{43C3E055-6F9D-092C-7F4B-CBBEE01624C2}"/>
               </a:ext>
             </a:extLst>
           </p:cNvPr>
@@ -3647,146 +4375,57 @@
         </p:nvSpPr>
         <p:spPr/>
         <p:txBody>
-          <a:bodyPr/>
-          <a:lstStyle/>
-          <a:p>
-            <a:r>
-              <a:rPr lang="en-CA" b="0" i="0" dirty="0">
-                <a:solidFill>
-                  <a:srgbClr val="1F2328"/>
-                </a:solidFill>
+          <a:bodyPr>
+            <a:normAutofit fontScale="90000"/>
+          </a:bodyPr>
+          <a:lstStyle/>
+          <a:p>
+            <a:r>
+              <a:rPr lang="en-US" b="1" i="0" dirty="0">
                 <a:effectLst/>
                 <a:highlight>
                   <a:srgbClr val="FFFFFF"/>
                 </a:highlight>
-                <a:latin typeface="Mona Sans"/>
+                <a:latin typeface="Hubot Sans"/>
               </a:rPr>
-              <a:t>Luck Surface Area</a:t>
-            </a:r>
-            <a:endParaRPr lang="en-CA" dirty="0"/>
-          </a:p>
-        </p:txBody>
-      </p:sp>
-      <p:sp>
-        <p:nvSpPr>
-          <p:cNvPr id="3" name="Content Placeholder 2">
-            <a:extLst>
-              <a:ext uri="{FF2B5EF4-FFF2-40B4-BE49-F238E27FC236}">
-                <a16:creationId xmlns:a16="http://schemas.microsoft.com/office/drawing/2014/main" id="{C0CB419B-20FC-A10A-CCB2-3AE360A5884B}"/>
-              </a:ext>
-            </a:extLst>
-          </p:cNvPr>
-          <p:cNvSpPr>
-            <a:spLocks noGrp="1"/>
-          </p:cNvSpPr>
-          <p:nvPr>
-            <p:ph idx="1"/>
-          </p:nvPr>
-        </p:nvSpPr>
-        <p:spPr/>
-        <p:txBody>
-          <a:bodyPr/>
-          <a:lstStyle/>
-          <a:p>
-            <a:r>
-              <a:rPr lang="en-US" b="0" i="1" dirty="0">
-                <a:solidFill>
-                  <a:srgbClr val="1F2328"/>
-                </a:solidFill>
+              <a:t>Publishing your work increases your luck</a:t>
+            </a:r>
+            <a:br>
+              <a:rPr lang="en-US" b="1" i="0" dirty="0">
                 <a:effectLst/>
                 <a:highlight>
                   <a:srgbClr val="FFFFFF"/>
                 </a:highlight>
-                <a:latin typeface="Mona Sans"/>
+                <a:latin typeface="Hubot Sans"/>
               </a:rPr>
-              <a:t>"The amount of serendipity that will occur in your life, your Luck Surface Area, is directly proportional to the degree to which you </a:t>
-            </a:r>
-            <a:r>
-              <a:rPr lang="en-US" b="1" i="1" dirty="0">
-                <a:solidFill>
-                  <a:srgbClr val="1F2328"/>
-                </a:solidFill>
-                <a:effectLst/>
-                <a:highlight>
-                  <a:srgbClr val="FFFFFF"/>
-                </a:highlight>
-                <a:latin typeface="Mona Sans"/>
-              </a:rPr>
-              <a:t>do something</a:t>
-            </a:r>
-            <a:r>
-              <a:rPr lang="en-US" b="0" i="1" dirty="0">
-                <a:solidFill>
-                  <a:srgbClr val="1F2328"/>
-                </a:solidFill>
-                <a:effectLst/>
-                <a:highlight>
-                  <a:srgbClr val="FFFFFF"/>
-                </a:highlight>
-                <a:latin typeface="Mona Sans"/>
-              </a:rPr>
-              <a:t> you’re passionate about combined with the total number of people to whom this is </a:t>
-            </a:r>
-            <a:r>
-              <a:rPr lang="en-US" b="1" i="1" dirty="0">
-                <a:solidFill>
-                  <a:srgbClr val="1F2328"/>
-                </a:solidFill>
-                <a:effectLst/>
-                <a:highlight>
-                  <a:srgbClr val="FFFFFF"/>
-                </a:highlight>
-                <a:latin typeface="Mona Sans"/>
-              </a:rPr>
-              <a:t>effectively communicated</a:t>
-            </a:r>
-            <a:r>
-              <a:rPr lang="en-US" b="0" i="1" dirty="0">
-                <a:solidFill>
-                  <a:srgbClr val="1F2328"/>
-                </a:solidFill>
-                <a:effectLst/>
-                <a:highlight>
-                  <a:srgbClr val="FFFFFF"/>
-                </a:highlight>
-                <a:latin typeface="Mona Sans"/>
-              </a:rPr>
-              <a:t>.“</a:t>
-            </a:r>
-          </a:p>
-          <a:p>
-            <a:endParaRPr lang="en-US" i="1" dirty="0">
-              <a:solidFill>
-                <a:srgbClr val="1F2328"/>
-              </a:solidFill>
-              <a:highlight>
-                <a:srgbClr val="FFFFFF"/>
-              </a:highlight>
-              <a:latin typeface="Mona Sans"/>
-            </a:endParaRPr>
-          </a:p>
-          <a:p>
-            <a:r>
-              <a:rPr lang="en-US" b="0" i="0" dirty="0">
-                <a:solidFill>
-                  <a:srgbClr val="484848"/>
-                </a:solidFill>
-                <a:effectLst/>
-                <a:latin typeface="Arial" panose="020B0604020202020204" pitchFamily="34" charset="0"/>
-              </a:rPr>
-              <a:t>L = D * T, where L is luck, D is doing and T is telling. </a:t>
-            </a:r>
-            <a:endParaRPr lang="en-US" b="0" i="1" dirty="0">
-              <a:solidFill>
-                <a:srgbClr val="1F2328"/>
-              </a:solidFill>
-              <a:effectLst/>
-              <a:highlight>
-                <a:srgbClr val="FFFFFF"/>
-              </a:highlight>
-              <a:latin typeface="Mona Sans"/>
-            </a:endParaRPr>
-          </a:p>
+            </a:br>
+            <a:br>
+              <a:rPr lang="en-US" dirty="0"/>
+            </a:br>
+            <a:endParaRPr lang="en-CA" dirty="0"/>
+          </a:p>
+        </p:txBody>
+      </p:sp>
+      <p:sp>
+        <p:nvSpPr>
+          <p:cNvPr id="3" name="Content Placeholder 2">
+            <a:extLst>
+              <a:ext uri="{FF2B5EF4-FFF2-40B4-BE49-F238E27FC236}">
+                <a16:creationId xmlns:a16="http://schemas.microsoft.com/office/drawing/2014/main" id="{9C61938C-7C02-5331-5286-B1C62D430057}"/>
+              </a:ext>
+            </a:extLst>
+          </p:cNvPr>
+          <p:cNvSpPr>
+            <a:spLocks noGrp="1"/>
+          </p:cNvSpPr>
+          <p:nvPr>
+            <p:ph idx="1"/>
+          </p:nvPr>
+        </p:nvSpPr>
+        <p:spPr/>
+        <p:txBody>
+          <a:bodyPr/>
+          <a:lstStyle/>
           <a:p>
             <a:r>
               <a:rPr lang="en-US" b="0" i="0" dirty="0">
@@ -3799,7 +4438,33 @@
                 </a:highlight>
                 <a:latin typeface="Mona Sans"/>
               </a:rPr>
-              <a:t>The more things you do multiplied by the more people you tell, the larger your Luck Surface Area becomes. The larger your Luck Surface Area, the more likely you are to catch luck as it flows by.</a:t>
+              <a:t>Luck is when something unexpected and good happens to you. Unexpected and good. Who doesn’t want to increase the odds of something unexpected and good?</a:t>
+            </a:r>
+          </a:p>
+          <a:p>
+            <a:endParaRPr lang="en-US" dirty="0">
+              <a:solidFill>
+                <a:srgbClr val="1F2328"/>
+              </a:solidFill>
+              <a:highlight>
+                <a:srgbClr val="FFFFFF"/>
+              </a:highlight>
+              <a:latin typeface="Mona Sans"/>
+            </a:endParaRPr>
+          </a:p>
+          <a:p>
+            <a:r>
+              <a:rPr lang="en-US" b="0" i="0" dirty="0">
+                <a:solidFill>
+                  <a:srgbClr val="1F2328"/>
+                </a:solidFill>
+                <a:effectLst/>
+                <a:highlight>
+                  <a:srgbClr val="FFFFFF"/>
+                </a:highlight>
+                <a:latin typeface="Mona Sans"/>
+              </a:rPr>
+              <a:t>How can we increase the odds of finding luck? By being a person who works in public. By doing work and being public about it, you build a reputation for yourself. You build a track record. You build a public body of work that speaks on your behalf better than any resume ever could.</a:t>
             </a:r>
             <a:endParaRPr lang="en-CA" dirty="0"/>
           </a:p>
@@ -3808,7 +4473,7 @@
     </p:spTree>
     <p:extLst>
       <p:ext uri="{BB962C8B-B14F-4D97-AF65-F5344CB8AC3E}">
-        <p14:creationId xmlns:p14="http://schemas.microsoft.com/office/powerpoint/2010/main" val="601373674"/>
+        <p14:creationId xmlns:p14="http://schemas.microsoft.com/office/powerpoint/2010/main" val="2397863608"/>
       </p:ext>
     </p:extLst>
   </p:cSld>
@@ -3840,7 +4505,7 @@
           <p:cNvPr id="2" name="Title 1">
             <a:extLst>
               <a:ext uri="{FF2B5EF4-FFF2-40B4-BE49-F238E27FC236}">
-                <a16:creationId xmlns:a16="http://schemas.microsoft.com/office/drawing/2014/main" id="{533F7FD2-579F-97BB-748B-C0C3B01A3C75}"/>
+                <a16:creationId xmlns:a16="http://schemas.microsoft.com/office/drawing/2014/main" id="{9643BAE4-7376-23A4-B38D-AA5768AC943C}"/>
               </a:ext>
             </a:extLst>
           </p:cNvPr>
@@ -3856,33 +4521,8 @@
           <a:bodyPr/>
           <a:lstStyle/>
           <a:p>
-            <a:endParaRPr lang="en-CA"/>
-          </a:p>
-        </p:txBody>
-      </p:sp>
-      <p:sp>
-        <p:nvSpPr>
-          <p:cNvPr id="3" name="Content Placeholder 2">
-            <a:extLst>
-              <a:ext uri="{FF2B5EF4-FFF2-40B4-BE49-F238E27FC236}">
-                <a16:creationId xmlns:a16="http://schemas.microsoft.com/office/drawing/2014/main" id="{6E40EA07-EE0D-05B4-2F98-DD6E07759875}"/>
-              </a:ext>
-            </a:extLst>
-          </p:cNvPr>
-          <p:cNvSpPr>
-            <a:spLocks noGrp="1"/>
-          </p:cNvSpPr>
-          <p:nvPr>
-            <p:ph idx="1"/>
-          </p:nvPr>
-        </p:nvSpPr>
-        <p:spPr/>
-        <p:txBody>
-          <a:bodyPr/>
-          <a:lstStyle/>
-          <a:p>
-            <a:r>
-              <a:rPr lang="en-US" b="1" i="0" dirty="0">
+            <a:r>
+              <a:rPr lang="en-CA" b="0" i="0" dirty="0">
                 <a:solidFill>
                   <a:srgbClr val="1F2328"/>
                 </a:solidFill>
@@ -3890,26 +4530,147 @@
                 <a:highlight>
                   <a:srgbClr val="FFFFFF"/>
                 </a:highlight>
-                <a:latin typeface="Hubot Sans"/>
+                <a:latin typeface="Mona Sans"/>
               </a:rPr>
-              <a:t>Whatever you’re excited about, be excited about it publicly.</a:t>
-            </a:r>
-          </a:p>
-          <a:p>
-            <a:endParaRPr lang="en-US" b="1" dirty="0">
+              <a:t>Luck Surface Area</a:t>
+            </a:r>
+            <a:endParaRPr lang="en-CA" dirty="0"/>
+          </a:p>
+        </p:txBody>
+      </p:sp>
+      <p:sp>
+        <p:nvSpPr>
+          <p:cNvPr id="3" name="Content Placeholder 2">
+            <a:extLst>
+              <a:ext uri="{FF2B5EF4-FFF2-40B4-BE49-F238E27FC236}">
+                <a16:creationId xmlns:a16="http://schemas.microsoft.com/office/drawing/2014/main" id="{C0CB419B-20FC-A10A-CCB2-3AE360A5884B}"/>
+              </a:ext>
+            </a:extLst>
+          </p:cNvPr>
+          <p:cNvSpPr>
+            <a:spLocks noGrp="1"/>
+          </p:cNvSpPr>
+          <p:nvPr>
+            <p:ph idx="1"/>
+          </p:nvPr>
+        </p:nvSpPr>
+        <p:spPr/>
+        <p:txBody>
+          <a:bodyPr/>
+          <a:lstStyle/>
+          <a:p>
+            <a:r>
+              <a:rPr lang="en-US" b="0" i="1" dirty="0">
+                <a:solidFill>
+                  <a:srgbClr val="1F2328"/>
+                </a:solidFill>
+                <a:effectLst/>
+                <a:highlight>
+                  <a:srgbClr val="FFFFFF"/>
+                </a:highlight>
+                <a:latin typeface="Mona Sans"/>
+              </a:rPr>
+              <a:t>"The amount of serendipity that will occur in your life, your Luck Surface Area, is directly proportional to the degree to which you </a:t>
+            </a:r>
+            <a:r>
+              <a:rPr lang="en-US" b="1" i="1" dirty="0">
+                <a:solidFill>
+                  <a:srgbClr val="1F2328"/>
+                </a:solidFill>
+                <a:effectLst/>
+                <a:highlight>
+                  <a:srgbClr val="FFFFFF"/>
+                </a:highlight>
+                <a:latin typeface="Mona Sans"/>
+              </a:rPr>
+              <a:t>do something</a:t>
+            </a:r>
+            <a:r>
+              <a:rPr lang="en-US" b="0" i="1" dirty="0">
+                <a:solidFill>
+                  <a:srgbClr val="1F2328"/>
+                </a:solidFill>
+                <a:effectLst/>
+                <a:highlight>
+                  <a:srgbClr val="FFFFFF"/>
+                </a:highlight>
+                <a:latin typeface="Mona Sans"/>
+              </a:rPr>
+              <a:t> you’re passionate about combined with the total number of people to whom this is </a:t>
+            </a:r>
+            <a:r>
+              <a:rPr lang="en-US" b="1" i="1" dirty="0">
+                <a:solidFill>
+                  <a:srgbClr val="1F2328"/>
+                </a:solidFill>
+                <a:effectLst/>
+                <a:highlight>
+                  <a:srgbClr val="FFFFFF"/>
+                </a:highlight>
+                <a:latin typeface="Mona Sans"/>
+              </a:rPr>
+              <a:t>effectively communicated</a:t>
+            </a:r>
+            <a:r>
+              <a:rPr lang="en-US" b="0" i="1" dirty="0">
+                <a:solidFill>
+                  <a:srgbClr val="1F2328"/>
+                </a:solidFill>
+                <a:effectLst/>
+                <a:highlight>
+                  <a:srgbClr val="FFFFFF"/>
+                </a:highlight>
+                <a:latin typeface="Mona Sans"/>
+              </a:rPr>
+              <a:t>.“</a:t>
+            </a:r>
+          </a:p>
+          <a:p>
+            <a:endParaRPr lang="en-US" i="1" dirty="0">
               <a:solidFill>
                 <a:srgbClr val="1F2328"/>
               </a:solidFill>
               <a:highlight>
                 <a:srgbClr val="FFFFFF"/>
               </a:highlight>
-              <a:latin typeface="Hubot Sans"/>
+              <a:latin typeface="Mona Sans"/>
             </a:endParaRPr>
           </a:p>
           <a:p>
             <a:r>
-              <a:rPr lang="en-US" dirty="0"/>
-              <a:t>blogging, podcasting, commenting in online discussions, and following up with every customer and user, you increase the likelihood of having a serendipitous moment. It’s a fun concept to consider – but perhaps less of a scientific occurrence than yet another example of the Law of Averages.</a:t>
+              <a:rPr lang="en-US" b="0" i="0" dirty="0">
+                <a:solidFill>
+                  <a:srgbClr val="484848"/>
+                </a:solidFill>
+                <a:effectLst/>
+                <a:latin typeface="Arial" panose="020B0604020202020204" pitchFamily="34" charset="0"/>
+              </a:rPr>
+              <a:t>L = D * T, where L is luck, D is doing and T is telling. </a:t>
+            </a:r>
+            <a:endParaRPr lang="en-US" b="0" i="1" dirty="0">
+              <a:solidFill>
+                <a:srgbClr val="1F2328"/>
+              </a:solidFill>
+              <a:effectLst/>
+              <a:highlight>
+                <a:srgbClr val="FFFFFF"/>
+              </a:highlight>
+              <a:latin typeface="Mona Sans"/>
+            </a:endParaRPr>
+          </a:p>
+          <a:p>
+            <a:r>
+              <a:rPr lang="en-US" b="0" i="0" dirty="0">
+                <a:solidFill>
+                  <a:srgbClr val="1F2328"/>
+                </a:solidFill>
+                <a:effectLst/>
+                <a:highlight>
+                  <a:srgbClr val="FFFFFF"/>
+                </a:highlight>
+                <a:latin typeface="Mona Sans"/>
+              </a:rPr>
+              <a:t>The more things you do multiplied by the more people you tell, the larger your Luck Surface Area becomes. The larger your Luck Surface Area, the more likely you are to catch luck as it flows by.</a:t>
             </a:r>
             <a:endParaRPr lang="en-CA" dirty="0"/>
           </a:p>
@@ -3918,7 +4679,7 @@
     </p:spTree>
     <p:extLst>
       <p:ext uri="{BB962C8B-B14F-4D97-AF65-F5344CB8AC3E}">
-        <p14:creationId xmlns:p14="http://schemas.microsoft.com/office/powerpoint/2010/main" val="3932611584"/>
+        <p14:creationId xmlns:p14="http://schemas.microsoft.com/office/powerpoint/2010/main" val="601373674"/>
       </p:ext>
     </p:extLst>
   </p:cSld>
@@ -3950,7 +4711,7 @@
           <p:cNvPr id="2" name="Title 1">
             <a:extLst>
               <a:ext uri="{FF2B5EF4-FFF2-40B4-BE49-F238E27FC236}">
-                <a16:creationId xmlns:a16="http://schemas.microsoft.com/office/drawing/2014/main" id="{101E4078-749B-D34D-8731-BC23D0A42ECC}"/>
+                <a16:creationId xmlns:a16="http://schemas.microsoft.com/office/drawing/2014/main" id="{87E24DC7-883C-97E1-BD0F-19F1B6A5523A}"/>
               </a:ext>
             </a:extLst>
           </p:cNvPr>
@@ -3970,94 +4731,45 @@
           </a:p>
         </p:txBody>
       </p:sp>
-      <p:sp>
-        <p:nvSpPr>
-          <p:cNvPr id="3" name="Content Placeholder 2">
-            <a:extLst>
-              <a:ext uri="{FF2B5EF4-FFF2-40B4-BE49-F238E27FC236}">
-                <a16:creationId xmlns:a16="http://schemas.microsoft.com/office/drawing/2014/main" id="{3C998FA9-25A0-7B6F-A720-8F81B48CE001}"/>
-              </a:ext>
-            </a:extLst>
-          </p:cNvPr>
-          <p:cNvSpPr>
-            <a:spLocks noGrp="1"/>
-          </p:cNvSpPr>
+      <p:pic>
+        <p:nvPicPr>
+          <p:cNvPr id="5" name="Content Placeholder 4">
+            <a:extLst>
+              <a:ext uri="{FF2B5EF4-FFF2-40B4-BE49-F238E27FC236}">
+                <a16:creationId xmlns:a16="http://schemas.microsoft.com/office/drawing/2014/main" id="{C915806B-A44A-CEF0-26CA-B4C63742E47F}"/>
+              </a:ext>
+            </a:extLst>
+          </p:cNvPr>
+          <p:cNvPicPr>
+            <a:picLocks noGrp="1" noChangeAspect="1"/>
+          </p:cNvPicPr>
           <p:nvPr>
             <p:ph idx="1"/>
           </p:nvPr>
-        </p:nvSpPr>
-        <p:spPr/>
-        <p:txBody>
-          <a:bodyPr/>
-          <a:lstStyle/>
-          <a:p>
-            <a:pPr algn="l"/>
-            <a:r>
-              <a:rPr lang="en-US" b="1" i="0" dirty="0">
-                <a:solidFill>
-                  <a:srgbClr val="1F2328"/>
-                </a:solidFill>
-                <a:effectLst/>
-                <a:highlight>
-                  <a:srgbClr val="FFFFFF"/>
-                </a:highlight>
-                <a:latin typeface="Mona Sans"/>
-              </a:rPr>
-              <a:t>Share Your Learnings at a Sustainable Pace</a:t>
-            </a:r>
-          </a:p>
-          <a:p>
-            <a:r>
-              <a:rPr lang="en-US" b="0" i="0" dirty="0">
-                <a:solidFill>
-                  <a:srgbClr val="1F2328"/>
-                </a:solidFill>
-                <a:effectLst/>
-                <a:highlight>
-                  <a:srgbClr val="FFFFFF"/>
-                </a:highlight>
-                <a:latin typeface="Mona Sans"/>
-              </a:rPr>
-              <a:t> </a:t>
-            </a:r>
-            <a:r>
-              <a:rPr lang="en-US" b="0" i="0" u="none" strike="noStrike" dirty="0">
-                <a:solidFill>
-                  <a:srgbClr val="4969ED"/>
-                </a:solidFill>
-                <a:effectLst/>
-                <a:highlight>
-                  <a:srgbClr val="FFFFFF"/>
-                </a:highlight>
-                <a:latin typeface="Mona Sans"/>
-                <a:hlinkClick r:id="rId2"/>
-              </a:rPr>
-              <a:t>Atomic Habits</a:t>
-            </a:r>
-            <a:r>
-              <a:rPr lang="en-US" b="0" i="0" dirty="0">
-                <a:solidFill>
-                  <a:srgbClr val="1F2328"/>
-                </a:solidFill>
-                <a:effectLst/>
-                <a:highlight>
-                  <a:srgbClr val="FFFFFF"/>
-                </a:highlight>
-                <a:latin typeface="Mona Sans"/>
-              </a:rPr>
-              <a:t> by James Clear is that, over time, it’s generally more impactful to make small, consistent progress towards an identity-based goal (like being someone who runs regularly) than inconsistently focusing on one huge goal (like running a marathon). </a:t>
-            </a:r>
-            <a:br>
-              <a:rPr lang="en-US" dirty="0"/>
-            </a:br>
-            <a:endParaRPr lang="en-CA" dirty="0"/>
-          </a:p>
-        </p:txBody>
-      </p:sp>
+        </p:nvPicPr>
+        <p:blipFill>
+          <a:blip r:embed="rId2">
+            <a:extLst>
+              <a:ext uri="{28A0092B-C50C-407E-A947-70E740481C1C}">
+                <a14:useLocalDpi xmlns:a14="http://schemas.microsoft.com/office/drawing/2010/main" val="0"/>
+              </a:ext>
+            </a:extLst>
+          </a:blip>
+          <a:stretch>
+            <a:fillRect/>
+          </a:stretch>
+        </p:blipFill>
+        <p:spPr>
+          <a:xfrm>
+            <a:off x="2081851" y="1825625"/>
+            <a:ext cx="8028298" cy="4351338"/>
+          </a:xfrm>
+        </p:spPr>
+      </p:pic>
     </p:spTree>
     <p:extLst>
       <p:ext uri="{BB962C8B-B14F-4D97-AF65-F5344CB8AC3E}">
-        <p14:creationId xmlns:p14="http://schemas.microsoft.com/office/powerpoint/2010/main" val="1382203336"/>
+        <p14:creationId xmlns:p14="http://schemas.microsoft.com/office/powerpoint/2010/main" val="1618077767"/>
       </p:ext>
     </p:extLst>
   </p:cSld>
@@ -4089,7 +4801,7 @@
           <p:cNvPr id="2" name="Title 1">
             <a:extLst>
               <a:ext uri="{FF2B5EF4-FFF2-40B4-BE49-F238E27FC236}">
-                <a16:creationId xmlns:a16="http://schemas.microsoft.com/office/drawing/2014/main" id="{6A73ADAF-122A-F2BA-074F-55CFFF9C846A}"/>
+                <a16:creationId xmlns:a16="http://schemas.microsoft.com/office/drawing/2014/main" id="{029162C8-0EB7-D3FA-E2AC-1AFF873EE2DD}"/>
               </a:ext>
             </a:extLst>
           </p:cNvPr>
@@ -4105,8 +4817,323 @@
           <a:bodyPr/>
           <a:lstStyle/>
           <a:p>
-            <a:r>
-              <a:rPr lang="en-CA" b="0" i="0" dirty="0">
+            <a:endParaRPr lang="en-CA"/>
+          </a:p>
+        </p:txBody>
+      </p:sp>
+      <p:pic>
+        <p:nvPicPr>
+          <p:cNvPr id="5" name="Content Placeholder 4">
+            <a:extLst>
+              <a:ext uri="{FF2B5EF4-FFF2-40B4-BE49-F238E27FC236}">
+                <a16:creationId xmlns:a16="http://schemas.microsoft.com/office/drawing/2014/main" id="{4D91BCCB-D2EC-6703-70CD-DF46E1254278}"/>
+              </a:ext>
+            </a:extLst>
+          </p:cNvPr>
+          <p:cNvPicPr>
+            <a:picLocks noGrp="1" noChangeAspect="1"/>
+          </p:cNvPicPr>
+          <p:nvPr>
+            <p:ph idx="1"/>
+          </p:nvPr>
+        </p:nvPicPr>
+        <p:blipFill>
+          <a:blip r:embed="rId2">
+            <a:extLst>
+              <a:ext uri="{28A0092B-C50C-407E-A947-70E740481C1C}">
+                <a14:useLocalDpi xmlns:a14="http://schemas.microsoft.com/office/drawing/2010/main" val="0"/>
+              </a:ext>
+            </a:extLst>
+          </a:blip>
+          <a:stretch>
+            <a:fillRect/>
+          </a:stretch>
+        </p:blipFill>
+        <p:spPr>
+          <a:xfrm>
+            <a:off x="3486150" y="2096294"/>
+            <a:ext cx="5219700" cy="3810000"/>
+          </a:xfrm>
+        </p:spPr>
+      </p:pic>
+    </p:spTree>
+    <p:extLst>
+      <p:ext uri="{BB962C8B-B14F-4D97-AF65-F5344CB8AC3E}">
+        <p14:creationId xmlns:p14="http://schemas.microsoft.com/office/powerpoint/2010/main" val="3200646830"/>
+      </p:ext>
+    </p:extLst>
+  </p:cSld>
+  <p:clrMapOvr>
+    <a:masterClrMapping/>
+  </p:clrMapOvr>
+</p:sld>
+</file>
+
+<file path=ppt/slides/slide7.xml><?xml version="1.0" encoding="utf-8"?>
+<p:sld xmlns:a="http://schemas.openxmlformats.org/drawingml/2006/main" xmlns:r="http://schemas.openxmlformats.org/officeDocument/2006/relationships" xmlns:p="http://schemas.openxmlformats.org/presentationml/2006/main">
+  <p:cSld>
+    <p:spTree>
+      <p:nvGrpSpPr>
+        <p:cNvPr id="1" name=""/>
+        <p:cNvGrpSpPr/>
+        <p:nvPr/>
+      </p:nvGrpSpPr>
+      <p:grpSpPr>
+        <a:xfrm>
+          <a:off x="0" y="0"/>
+          <a:ext cx="0" cy="0"/>
+          <a:chOff x="0" y="0"/>
+          <a:chExt cx="0" cy="0"/>
+        </a:xfrm>
+      </p:grpSpPr>
+      <p:sp>
+        <p:nvSpPr>
+          <p:cNvPr id="2" name="Title 1">
+            <a:extLst>
+              <a:ext uri="{FF2B5EF4-FFF2-40B4-BE49-F238E27FC236}">
+                <a16:creationId xmlns:a16="http://schemas.microsoft.com/office/drawing/2014/main" id="{9365FAC3-F354-D22D-2323-B23CB745788C}"/>
+              </a:ext>
+            </a:extLst>
+          </p:cNvPr>
+          <p:cNvSpPr>
+            <a:spLocks noGrp="1"/>
+          </p:cNvSpPr>
+          <p:nvPr>
+            <p:ph type="title"/>
+          </p:nvPr>
+        </p:nvSpPr>
+        <p:spPr/>
+        <p:txBody>
+          <a:bodyPr/>
+          <a:lstStyle/>
+          <a:p>
+            <a:endParaRPr lang="en-CA"/>
+          </a:p>
+        </p:txBody>
+      </p:sp>
+      <p:sp>
+        <p:nvSpPr>
+          <p:cNvPr id="3" name="Content Placeholder 2">
+            <a:extLst>
+              <a:ext uri="{FF2B5EF4-FFF2-40B4-BE49-F238E27FC236}">
+                <a16:creationId xmlns:a16="http://schemas.microsoft.com/office/drawing/2014/main" id="{46B509C9-230D-A1FA-F2A9-BA61AB9DBCE5}"/>
+              </a:ext>
+            </a:extLst>
+          </p:cNvPr>
+          <p:cNvSpPr>
+            <a:spLocks noGrp="1"/>
+          </p:cNvSpPr>
+          <p:nvPr>
+            <p:ph idx="1"/>
+          </p:nvPr>
+        </p:nvSpPr>
+        <p:spPr/>
+        <p:txBody>
+          <a:bodyPr/>
+          <a:lstStyle/>
+          <a:p>
+            <a:endParaRPr lang="en-US" dirty="0"/>
+          </a:p>
+          <a:p>
+            <a:r>
+              <a:rPr lang="en-US" dirty="0"/>
+              <a:t>The law of averages refers the common belief that the relative frequency of an event should correspond to its probability. For example, if the probability of heads in a fair coin toss is 50%, then according to the law of averages, the proportion of heads in a series of tosses should be close to 50%.</a:t>
+            </a:r>
+          </a:p>
+          <a:p>
+            <a:endParaRPr lang="en-CA" dirty="0"/>
+          </a:p>
+        </p:txBody>
+      </p:sp>
+    </p:spTree>
+    <p:extLst>
+      <p:ext uri="{BB962C8B-B14F-4D97-AF65-F5344CB8AC3E}">
+        <p14:creationId xmlns:p14="http://schemas.microsoft.com/office/powerpoint/2010/main" val="3587041775"/>
+      </p:ext>
+    </p:extLst>
+  </p:cSld>
+  <p:clrMapOvr>
+    <a:masterClrMapping/>
+  </p:clrMapOvr>
+</p:sld>
+</file>
+
+<file path=ppt/slides/slide8.xml><?xml version="1.0" encoding="utf-8"?>
+<p:sld xmlns:a="http://schemas.openxmlformats.org/drawingml/2006/main" xmlns:r="http://schemas.openxmlformats.org/officeDocument/2006/relationships" xmlns:p="http://schemas.openxmlformats.org/presentationml/2006/main">
+  <p:cSld>
+    <p:spTree>
+      <p:nvGrpSpPr>
+        <p:cNvPr id="1" name=""/>
+        <p:cNvGrpSpPr/>
+        <p:nvPr/>
+      </p:nvGrpSpPr>
+      <p:grpSpPr>
+        <a:xfrm>
+          <a:off x="0" y="0"/>
+          <a:ext cx="0" cy="0"/>
+          <a:chOff x="0" y="0"/>
+          <a:chExt cx="0" cy="0"/>
+        </a:xfrm>
+      </p:grpSpPr>
+      <p:sp>
+        <p:nvSpPr>
+          <p:cNvPr id="2" name="Title 1">
+            <a:extLst>
+              <a:ext uri="{FF2B5EF4-FFF2-40B4-BE49-F238E27FC236}">
+                <a16:creationId xmlns:a16="http://schemas.microsoft.com/office/drawing/2014/main" id="{533F7FD2-579F-97BB-748B-C0C3B01A3C75}"/>
+              </a:ext>
+            </a:extLst>
+          </p:cNvPr>
+          <p:cNvSpPr>
+            <a:spLocks noGrp="1"/>
+          </p:cNvSpPr>
+          <p:nvPr>
+            <p:ph type="title"/>
+          </p:nvPr>
+        </p:nvSpPr>
+        <p:spPr/>
+        <p:txBody>
+          <a:bodyPr/>
+          <a:lstStyle/>
+          <a:p>
+            <a:endParaRPr lang="en-CA"/>
+          </a:p>
+        </p:txBody>
+      </p:sp>
+      <p:sp>
+        <p:nvSpPr>
+          <p:cNvPr id="3" name="Content Placeholder 2">
+            <a:extLst>
+              <a:ext uri="{FF2B5EF4-FFF2-40B4-BE49-F238E27FC236}">
+                <a16:creationId xmlns:a16="http://schemas.microsoft.com/office/drawing/2014/main" id="{6E40EA07-EE0D-05B4-2F98-DD6E07759875}"/>
+              </a:ext>
+            </a:extLst>
+          </p:cNvPr>
+          <p:cNvSpPr>
+            <a:spLocks noGrp="1"/>
+          </p:cNvSpPr>
+          <p:nvPr>
+            <p:ph idx="1"/>
+          </p:nvPr>
+        </p:nvSpPr>
+        <p:spPr/>
+        <p:txBody>
+          <a:bodyPr/>
+          <a:lstStyle/>
+          <a:p>
+            <a:r>
+              <a:rPr lang="en-US" b="1" i="0" dirty="0">
+                <a:solidFill>
+                  <a:srgbClr val="1F2328"/>
+                </a:solidFill>
+                <a:effectLst/>
+                <a:highlight>
+                  <a:srgbClr val="FFFFFF"/>
+                </a:highlight>
+                <a:latin typeface="Hubot Sans"/>
+              </a:rPr>
+              <a:t>Whatever you’re excited about, be excited about it publicly.</a:t>
+            </a:r>
+          </a:p>
+          <a:p>
+            <a:endParaRPr lang="en-US" b="1" dirty="0">
+              <a:solidFill>
+                <a:srgbClr val="1F2328"/>
+              </a:solidFill>
+              <a:highlight>
+                <a:srgbClr val="FFFFFF"/>
+              </a:highlight>
+              <a:latin typeface="Hubot Sans"/>
+            </a:endParaRPr>
+          </a:p>
+          <a:p>
+            <a:r>
+              <a:rPr lang="en-US" dirty="0"/>
+              <a:t>blogging, podcasting, commenting in online discussions, and following up with every customer and user, you increase the likelihood of having a serendipitous moment. It’s a fun concept to consider – but perhaps less of a scientific occurrence than yet another example of the Law of Averages.</a:t>
+            </a:r>
+            <a:endParaRPr lang="en-CA" dirty="0"/>
+          </a:p>
+        </p:txBody>
+      </p:sp>
+    </p:spTree>
+    <p:extLst>
+      <p:ext uri="{BB962C8B-B14F-4D97-AF65-F5344CB8AC3E}">
+        <p14:creationId xmlns:p14="http://schemas.microsoft.com/office/powerpoint/2010/main" val="3932611584"/>
+      </p:ext>
+    </p:extLst>
+  </p:cSld>
+  <p:clrMapOvr>
+    <a:masterClrMapping/>
+  </p:clrMapOvr>
+</p:sld>
+</file>
+
+<file path=ppt/slides/slide9.xml><?xml version="1.0" encoding="utf-8"?>
+<p:sld xmlns:a="http://schemas.openxmlformats.org/drawingml/2006/main" xmlns:r="http://schemas.openxmlformats.org/officeDocument/2006/relationships" xmlns:p="http://schemas.openxmlformats.org/presentationml/2006/main">
+  <p:cSld>
+    <p:spTree>
+      <p:nvGrpSpPr>
+        <p:cNvPr id="1" name=""/>
+        <p:cNvGrpSpPr/>
+        <p:nvPr/>
+      </p:nvGrpSpPr>
+      <p:grpSpPr>
+        <a:xfrm>
+          <a:off x="0" y="0"/>
+          <a:ext cx="0" cy="0"/>
+          <a:chOff x="0" y="0"/>
+          <a:chExt cx="0" cy="0"/>
+        </a:xfrm>
+      </p:grpSpPr>
+      <p:sp>
+        <p:nvSpPr>
+          <p:cNvPr id="2" name="Title 1">
+            <a:extLst>
+              <a:ext uri="{FF2B5EF4-FFF2-40B4-BE49-F238E27FC236}">
+                <a16:creationId xmlns:a16="http://schemas.microsoft.com/office/drawing/2014/main" id="{101E4078-749B-D34D-8731-BC23D0A42ECC}"/>
+              </a:ext>
+            </a:extLst>
+          </p:cNvPr>
+          <p:cNvSpPr>
+            <a:spLocks noGrp="1"/>
+          </p:cNvSpPr>
+          <p:nvPr>
+            <p:ph type="title"/>
+          </p:nvPr>
+        </p:nvSpPr>
+        <p:spPr/>
+        <p:txBody>
+          <a:bodyPr/>
+          <a:lstStyle/>
+          <a:p>
+            <a:endParaRPr lang="en-CA"/>
+          </a:p>
+        </p:txBody>
+      </p:sp>
+      <p:sp>
+        <p:nvSpPr>
+          <p:cNvPr id="3" name="Content Placeholder 2">
+            <a:extLst>
+              <a:ext uri="{FF2B5EF4-FFF2-40B4-BE49-F238E27FC236}">
+                <a16:creationId xmlns:a16="http://schemas.microsoft.com/office/drawing/2014/main" id="{3C998FA9-25A0-7B6F-A720-8F81B48CE001}"/>
+              </a:ext>
+            </a:extLst>
+          </p:cNvPr>
+          <p:cNvSpPr>
+            <a:spLocks noGrp="1"/>
+          </p:cNvSpPr>
+          <p:nvPr>
+            <p:ph idx="1"/>
+          </p:nvPr>
+        </p:nvSpPr>
+        <p:spPr/>
+        <p:txBody>
+          <a:bodyPr/>
+          <a:lstStyle/>
+          <a:p>
+            <a:pPr algn="l"/>
+            <a:r>
+              <a:rPr lang="en-US" b="1" i="0" dirty="0">
                 <a:solidFill>
                   <a:srgbClr val="1F2328"/>
                 </a:solidFill>
@@ -4116,35 +5143,12 @@
                 </a:highlight>
                 <a:latin typeface="Mona Sans"/>
               </a:rPr>
-              <a:t>process, care, and craft</a:t>
-            </a:r>
-            <a:endParaRPr lang="en-CA" dirty="0"/>
-          </a:p>
-        </p:txBody>
-      </p:sp>
-      <p:sp>
-        <p:nvSpPr>
-          <p:cNvPr id="3" name="Content Placeholder 2">
-            <a:extLst>
-              <a:ext uri="{FF2B5EF4-FFF2-40B4-BE49-F238E27FC236}">
-                <a16:creationId xmlns:a16="http://schemas.microsoft.com/office/drawing/2014/main" id="{33D86B02-AEF2-2387-ADD5-3763EB8923C7}"/>
-              </a:ext>
-            </a:extLst>
-          </p:cNvPr>
-          <p:cNvSpPr>
-            <a:spLocks noGrp="1"/>
-          </p:cNvSpPr>
-          <p:nvPr>
-            <p:ph idx="1"/>
-          </p:nvPr>
-        </p:nvSpPr>
-        <p:spPr/>
-        <p:txBody>
-          <a:bodyPr/>
-          <a:lstStyle/>
-          <a:p>
-            <a:r>
-              <a:rPr lang="en-US" b="0" i="0">
+              <a:t>Share Your Learnings at a Sustainable Pace</a:t>
+            </a:r>
+          </a:p>
+          <a:p>
+            <a:r>
+              <a:rPr lang="en-US" b="0" i="0" dirty="0">
                 <a:solidFill>
                   <a:srgbClr val="1F2328"/>
                 </a:solidFill>
@@ -4154,8 +5158,38 @@
                 </a:highlight>
                 <a:latin typeface="Mona Sans"/>
               </a:rPr>
-              <a:t>Digital gardening embraces the idea that the process of documenting is more important than the final presentation.</a:t>
-            </a:r>
+              <a:t> </a:t>
+            </a:r>
+            <a:r>
+              <a:rPr lang="en-US" b="0" i="0" u="none" strike="noStrike" dirty="0">
+                <a:solidFill>
+                  <a:srgbClr val="4969ED"/>
+                </a:solidFill>
+                <a:effectLst/>
+                <a:highlight>
+                  <a:srgbClr val="FFFFFF"/>
+                </a:highlight>
+                <a:latin typeface="Mona Sans"/>
+                <a:hlinkClick r:id="rId2"/>
+              </a:rPr>
+              <a:t>Atomic Habits</a:t>
+            </a:r>
+            <a:r>
+              <a:rPr lang="en-US" b="0" i="0" dirty="0">
+                <a:solidFill>
+                  <a:srgbClr val="1F2328"/>
+                </a:solidFill>
+                <a:effectLst/>
+                <a:highlight>
+                  <a:srgbClr val="FFFFFF"/>
+                </a:highlight>
+                <a:latin typeface="Mona Sans"/>
+              </a:rPr>
+              <a:t> by James Clear is that, over time, it’s generally more impactful to make small, consistent progress towards an identity-based goal (like being someone who runs regularly) than inconsistently focusing on one huge goal (like running a marathon). </a:t>
+            </a:r>
+            <a:br>
+              <a:rPr lang="en-US" dirty="0"/>
+            </a:br>
             <a:endParaRPr lang="en-CA" dirty="0"/>
           </a:p>
         </p:txBody>
@@ -4163,7 +5197,7 @@
     </p:spTree>
     <p:extLst>
       <p:ext uri="{BB962C8B-B14F-4D97-AF65-F5344CB8AC3E}">
-        <p14:creationId xmlns:p14="http://schemas.microsoft.com/office/powerpoint/2010/main" val="397074678"/>
+        <p14:creationId xmlns:p14="http://schemas.microsoft.com/office/powerpoint/2010/main" val="1382203336"/>
       </p:ext>
     </p:extLst>
   </p:cSld>
@@ -4466,4 +5500,299 @@
     </a:ext>
   </a:extLst>
 </a:theme>
+</file>
+
+<file path=ppt/theme/theme2.xml><?xml version="1.0" encoding="utf-8"?>
+<a:theme xmlns:a="http://schemas.openxmlformats.org/drawingml/2006/main" name="Office Theme">
+  <a:themeElements>
+    <a:clrScheme name="Office">
+      <a:dk1>
+        <a:sysClr val="windowText" lastClr="000000"/>
+      </a:dk1>
+      <a:lt1>
+        <a:sysClr val="window" lastClr="FFFFFF"/>
+      </a:lt1>
+      <a:dk2>
+        <a:srgbClr val="44546A"/>
+      </a:dk2>
+      <a:lt2>
+        <a:srgbClr val="E7E6E6"/>
+      </a:lt2>
+      <a:accent1>
+        <a:srgbClr val="4472C4"/>
+      </a:accent1>
+      <a:accent2>
+        <a:srgbClr val="ED7D31"/>
+      </a:accent2>
+      <a:accent3>
+        <a:srgbClr val="A5A5A5"/>
+      </a:accent3>
+      <a:accent4>
+        <a:srgbClr val="FFC000"/>
+      </a:accent4>
+      <a:accent5>
+        <a:srgbClr val="5B9BD5"/>
+      </a:accent5>
+      <a:accent6>
+        <a:srgbClr val="70AD47"/>
+      </a:accent6>
+      <a:hlink>
+        <a:srgbClr val="0563C1"/>
+      </a:hlink>
+      <a:folHlink>
+        <a:srgbClr val="954F72"/>
+      </a:folHlink>
+    </a:clrScheme>
+    <a:fontScheme name="Office">
+      <a:majorFont>
+        <a:latin typeface="Calibri Light" panose="020F0302020204030204"/>
+        <a:ea typeface=""/>
+        <a:cs typeface=""/>
+        <a:font script="Jpan" typeface="游ゴシック Light"/>
+        <a:font script="Hang" typeface="맑은 고딕"/>
+        <a:font script="Hans" typeface="等线 Light"/>
+        <a:font script="Hant" typeface="新細明體"/>
+        <a:font script="Arab" typeface="Times New Roman"/>
+        <a:font script="Hebr" typeface="Times New Roman"/>
+        <a:font script="Thai" typeface="Angsana New"/>
+        <a:font script="Ethi" typeface="Nyala"/>
+        <a:font script="Beng" typeface="Vrinda"/>
+        <a:font script="Gujr" typeface="Shruti"/>
+        <a:font script="Khmr" typeface="MoolBoran"/>
+        <a:font script="Knda" typeface="Tunga"/>
+        <a:font script="Guru" typeface="Raavi"/>
+        <a:font script="Cans" typeface="Euphemia"/>
+        <a:font script="Cher" typeface="Plantagenet Cherokee"/>
+        <a:font script="Yiii" typeface="Microsoft Yi Baiti"/>
+        <a:font script="Tibt" typeface="Microsoft Himalaya"/>
+        <a:font script="Thaa" typeface="MV Boli"/>
+        <a:font script="Deva" typeface="Mangal"/>
+        <a:font script="Telu" typeface="Gautami"/>
+        <a:font script="Taml" typeface="Latha"/>
+        <a:font script="Syrc" typeface="Estrangelo Edessa"/>
+        <a:font script="Orya" typeface="Kalinga"/>
+        <a:font script="Mlym" typeface="Kartika"/>
+        <a:font script="Laoo" typeface="DokChampa"/>
+        <a:font script="Sinh" typeface="Iskoola Pota"/>
+        <a:font script="Mong" typeface="Mongolian Baiti"/>
+        <a:font script="Viet" typeface="Times New Roman"/>
+        <a:font script="Uigh" typeface="Microsoft Uighur"/>
+        <a:font script="Geor" typeface="Sylfaen"/>
+        <a:font script="Armn" typeface="Arial"/>
+        <a:font script="Bugi" typeface="Leelawadee UI"/>
+        <a:font script="Bopo" typeface="Microsoft JhengHei"/>
+        <a:font script="Java" typeface="Javanese Text"/>
+        <a:font script="Lisu" typeface="Segoe UI"/>
+        <a:font script="Mymr" typeface="Myanmar Text"/>
+        <a:font script="Nkoo" typeface="Ebrima"/>
+        <a:font script="Olck" typeface="Nirmala UI"/>
+        <a:font script="Osma" typeface="Ebrima"/>
+        <a:font script="Phag" typeface="Phagspa"/>
+        <a:font script="Syrn" typeface="Estrangelo Edessa"/>
+        <a:font script="Syrj" typeface="Estrangelo Edessa"/>
+        <a:font script="Syre" typeface="Estrangelo Edessa"/>
+        <a:font script="Sora" typeface="Nirmala UI"/>
+        <a:font script="Tale" typeface="Microsoft Tai Le"/>
+        <a:font script="Talu" typeface="Microsoft New Tai Lue"/>
+        <a:font script="Tfng" typeface="Ebrima"/>
+      </a:majorFont>
+      <a:minorFont>
+        <a:latin typeface="Calibri" panose="020F0502020204030204"/>
+        <a:ea typeface=""/>
+        <a:cs typeface=""/>
+        <a:font script="Jpan" typeface="游ゴシック"/>
+        <a:font script="Hang" typeface="맑은 고딕"/>
+        <a:font script="Hans" typeface="等线"/>
+        <a:font script="Hant" typeface="新細明體"/>
+        <a:font script="Arab" typeface="Arial"/>
+        <a:font script="Hebr" typeface="Arial"/>
+        <a:font script="Thai" typeface="Cordia New"/>
+        <a:font script="Ethi" typeface="Nyala"/>
+        <a:font script="Beng" typeface="Vrinda"/>
+        <a:font script="Gujr" typeface="Shruti"/>
+        <a:font script="Khmr" typeface="DaunPenh"/>
+        <a:font script="Knda" typeface="Tunga"/>
+        <a:font script="Guru" typeface="Raavi"/>
+        <a:font script="Cans" typeface="Euphemia"/>
+        <a:font script="Cher" typeface="Plantagenet Cherokee"/>
+        <a:font script="Yiii" typeface="Microsoft Yi Baiti"/>
+        <a:font script="Tibt" typeface="Microsoft Himalaya"/>
+        <a:font script="Thaa" typeface="MV Boli"/>
+        <a:font script="Deva" typeface="Mangal"/>
+        <a:font script="Telu" typeface="Gautami"/>
+        <a:font script="Taml" typeface="Latha"/>
+        <a:font script="Syrc" typeface="Estrangelo Edessa"/>
+        <a:font script="Orya" typeface="Kalinga"/>
+        <a:font script="Mlym" typeface="Kartika"/>
+        <a:font script="Laoo" typeface="DokChampa"/>
+        <a:font script="Sinh" typeface="Iskoola Pota"/>
+        <a:font script="Mong" typeface="Mongolian Baiti"/>
+        <a:font script="Viet" typeface="Arial"/>
+        <a:font script="Uigh" typeface="Microsoft Uighur"/>
+        <a:font script="Geor" typeface="Sylfaen"/>
+        <a:font script="Armn" typeface="Arial"/>
+        <a:font script="Bugi" typeface="Leelawadee UI"/>
+        <a:font script="Bopo" typeface="Microsoft JhengHei"/>
+        <a:font script="Java" typeface="Javanese Text"/>
+        <a:font script="Lisu" typeface="Segoe UI"/>
+        <a:font script="Mymr" typeface="Myanmar Text"/>
+        <a:font script="Nkoo" typeface="Ebrima"/>
+        <a:font script="Olck" typeface="Nirmala UI"/>
+        <a:font script="Osma" typeface="Ebrima"/>
+        <a:font script="Phag" typeface="Phagspa"/>
+        <a:font script="Syrn" typeface="Estrangelo Edessa"/>
+        <a:font script="Syrj" typeface="Estrangelo Edessa"/>
+        <a:font script="Syre" typeface="Estrangelo Edessa"/>
+        <a:font script="Sora" typeface="Nirmala UI"/>
+        <a:font script="Tale" typeface="Microsoft Tai Le"/>
+        <a:font script="Talu" typeface="Microsoft New Tai Lue"/>
+        <a:font script="Tfng" typeface="Ebrima"/>
+      </a:minorFont>
+    </a:fontScheme>
+    <a:fmtScheme name="Office">
+      <a:fillStyleLst>
+        <a:solidFill>
+          <a:schemeClr val="phClr"/>
+        </a:solidFill>
+        <a:gradFill rotWithShape="1">
+          <a:gsLst>
+            <a:gs pos="0">
+              <a:schemeClr val="phClr">
+                <a:lumMod val="110000"/>
+                <a:satMod val="105000"/>
+                <a:tint val="67000"/>
+              </a:schemeClr>
+            </a:gs>
+            <a:gs pos="50000">
+              <a:schemeClr val="phClr">
+                <a:lumMod val="105000"/>
+                <a:satMod val="103000"/>
+                <a:tint val="73000"/>
+              </a:schemeClr>
+            </a:gs>
+            <a:gs pos="100000">
+              <a:schemeClr val="phClr">
+                <a:lumMod val="105000"/>
+                <a:satMod val="109000"/>
+                <a:tint val="81000"/>
+              </a:schemeClr>
+            </a:gs>
+          </a:gsLst>
+          <a:lin ang="5400000" scaled="0"/>
+        </a:gradFill>
+        <a:gradFill rotWithShape="1">
+          <a:gsLst>
+            <a:gs pos="0">
+              <a:schemeClr val="phClr">
+                <a:satMod val="103000"/>
+                <a:lumMod val="102000"/>
+                <a:tint val="94000"/>
+              </a:schemeClr>
+            </a:gs>
+            <a:gs pos="50000">
+              <a:schemeClr val="phClr">
+                <a:satMod val="110000"/>
+                <a:lumMod val="100000"/>
+                <a:shade val="100000"/>
+              </a:schemeClr>
+            </a:gs>
+            <a:gs pos="100000">
+              <a:schemeClr val="phClr">
+                <a:lumMod val="99000"/>
+                <a:satMod val="120000"/>
+                <a:shade val="78000"/>
+              </a:schemeClr>
+            </a:gs>
+          </a:gsLst>
+          <a:lin ang="5400000" scaled="0"/>
+        </a:gradFill>
+      </a:fillStyleLst>
+      <a:lnStyleLst>
+        <a:ln w="6350" cap="flat" cmpd="sng" algn="ctr">
+          <a:solidFill>
+            <a:schemeClr val="phClr"/>
+          </a:solidFill>
+          <a:prstDash val="solid"/>
+          <a:miter lim="800000"/>
+        </a:ln>
+        <a:ln w="12700" cap="flat" cmpd="sng" algn="ctr">
+          <a:solidFill>
+            <a:schemeClr val="phClr"/>
+          </a:solidFill>
+          <a:prstDash val="solid"/>
+          <a:miter lim="800000"/>
+        </a:ln>
+        <a:ln w="19050" cap="flat" cmpd="sng" algn="ctr">
+          <a:solidFill>
+            <a:schemeClr val="phClr"/>
+          </a:solidFill>
+          <a:prstDash val="solid"/>
+          <a:miter lim="800000"/>
+        </a:ln>
+      </a:lnStyleLst>
+      <a:effectStyleLst>
+        <a:effectStyle>
+          <a:effectLst/>
+        </a:effectStyle>
+        <a:effectStyle>
+          <a:effectLst/>
+        </a:effectStyle>
+        <a:effectStyle>
+          <a:effectLst>
+            <a:outerShdw blurRad="57150" dist="19050" dir="5400000" algn="ctr" rotWithShape="0">
+              <a:srgbClr val="000000">
+                <a:alpha val="63000"/>
+              </a:srgbClr>
+            </a:outerShdw>
+          </a:effectLst>
+        </a:effectStyle>
+      </a:effectStyleLst>
+      <a:bgFillStyleLst>
+        <a:solidFill>
+          <a:schemeClr val="phClr"/>
+        </a:solidFill>
+        <a:solidFill>
+          <a:schemeClr val="phClr">
+            <a:tint val="95000"/>
+            <a:satMod val="170000"/>
+          </a:schemeClr>
+        </a:solidFill>
+        <a:gradFill rotWithShape="1">
+          <a:gsLst>
+            <a:gs pos="0">
+              <a:schemeClr val="phClr">
+                <a:tint val="93000"/>
+                <a:satMod val="150000"/>
+                <a:shade val="98000"/>
+                <a:lumMod val="102000"/>
+              </a:schemeClr>
+            </a:gs>
+            <a:gs pos="50000">
+              <a:schemeClr val="phClr">
+                <a:tint val="98000"/>
+                <a:satMod val="130000"/>
+                <a:shade val="90000"/>
+                <a:lumMod val="103000"/>
+              </a:schemeClr>
+            </a:gs>
+            <a:gs pos="100000">
+              <a:schemeClr val="phClr">
+                <a:shade val="63000"/>
+                <a:satMod val="120000"/>
+              </a:schemeClr>
+            </a:gs>
+          </a:gsLst>
+          <a:lin ang="5400000" scaled="0"/>
+        </a:gradFill>
+      </a:bgFillStyleLst>
+    </a:fmtScheme>
+  </a:themeElements>
+  <a:objectDefaults/>
+  <a:extraClrSchemeLst/>
+  <a:extLst>
+    <a:ext uri="{05A4C25C-085E-4340-85A3-A5531E510DB2}">
+      <thm15:themeFamily xmlns:thm15="http://schemas.microsoft.com/office/thememl/2012/main" name="Office Theme" id="{62F939B6-93AF-4DB8-9C6B-D6C7DFDC589F}" vid="{4A3C46E8-61CC-4603-A589-7422A47A8E4A}"/>
+    </a:ext>
+  </a:extLst>
+</a:theme>
 </file>
</xml_diff>